<commit_message>
Term Project 1차 발표
</commit_message>
<xml_diff>
--- a/2D GameProgramming/Final Project/Term Project_1st Presentation.pptx
+++ b/2D GameProgramming/Final Project/Term Project_1st Presentation.pptx
@@ -12,18 +12,19 @@
     <p:sldId id="264" r:id="rId6"/>
     <p:sldId id="265" r:id="rId7"/>
     <p:sldId id="266" r:id="rId8"/>
+    <p:sldId id="268" r:id="rId9"/>
   </p:sldIdLst>
   <p:sldSz cx="12192000" cy="6858000"/>
   <p:notesSz cx="6858000" cy="9144000"/>
   <p:embeddedFontLst>
     <p:embeddedFont>
       <p:font typeface="Koverwatch" panose="02020603020101020101" pitchFamily="18" charset="-127"/>
-      <p:regular r:id="rId9"/>
+      <p:regular r:id="rId10"/>
     </p:embeddedFont>
     <p:embeddedFont>
       <p:font typeface="맑은 고딕" panose="020B0503020000020004" pitchFamily="50" charset="-127"/>
-      <p:regular r:id="rId10"/>
-      <p:bold r:id="rId11"/>
+      <p:regular r:id="rId11"/>
+      <p:bold r:id="rId12"/>
     </p:embeddedFont>
   </p:embeddedFontLst>
   <p:defaultTextStyle>
@@ -276,7 +277,7 @@
           <a:p>
             <a:fld id="{2586E04A-ECEF-4D3E-B184-B1444B3FAD15}" type="datetimeFigureOut">
               <a:rPr lang="ko-KR" altLang="en-US" smtClean="0"/>
-              <a:t>2020-10-08(Thu)</a:t>
+              <a:t>2020-11-22(Sun)</a:t>
             </a:fld>
             <a:endParaRPr lang="ko-KR" altLang="en-US"/>
           </a:p>
@@ -474,7 +475,7 @@
           <a:p>
             <a:fld id="{2586E04A-ECEF-4D3E-B184-B1444B3FAD15}" type="datetimeFigureOut">
               <a:rPr lang="ko-KR" altLang="en-US" smtClean="0"/>
-              <a:t>2020-10-08(Thu)</a:t>
+              <a:t>2020-11-22(Sun)</a:t>
             </a:fld>
             <a:endParaRPr lang="ko-KR" altLang="en-US"/>
           </a:p>
@@ -682,7 +683,7 @@
           <a:p>
             <a:fld id="{2586E04A-ECEF-4D3E-B184-B1444B3FAD15}" type="datetimeFigureOut">
               <a:rPr lang="ko-KR" altLang="en-US" smtClean="0"/>
-              <a:t>2020-10-08(Thu)</a:t>
+              <a:t>2020-11-22(Sun)</a:t>
             </a:fld>
             <a:endParaRPr lang="ko-KR" altLang="en-US"/>
           </a:p>
@@ -880,7 +881,7 @@
           <a:p>
             <a:fld id="{2586E04A-ECEF-4D3E-B184-B1444B3FAD15}" type="datetimeFigureOut">
               <a:rPr lang="ko-KR" altLang="en-US" smtClean="0"/>
-              <a:t>2020-10-08(Thu)</a:t>
+              <a:t>2020-11-22(Sun)</a:t>
             </a:fld>
             <a:endParaRPr lang="ko-KR" altLang="en-US"/>
           </a:p>
@@ -1155,7 +1156,7 @@
           <a:p>
             <a:fld id="{2586E04A-ECEF-4D3E-B184-B1444B3FAD15}" type="datetimeFigureOut">
               <a:rPr lang="ko-KR" altLang="en-US" smtClean="0"/>
-              <a:t>2020-10-08(Thu)</a:t>
+              <a:t>2020-11-22(Sun)</a:t>
             </a:fld>
             <a:endParaRPr lang="ko-KR" altLang="en-US"/>
           </a:p>
@@ -1420,7 +1421,7 @@
           <a:p>
             <a:fld id="{2586E04A-ECEF-4D3E-B184-B1444B3FAD15}" type="datetimeFigureOut">
               <a:rPr lang="ko-KR" altLang="en-US" smtClean="0"/>
-              <a:t>2020-10-08(Thu)</a:t>
+              <a:t>2020-11-22(Sun)</a:t>
             </a:fld>
             <a:endParaRPr lang="ko-KR" altLang="en-US"/>
           </a:p>
@@ -1832,7 +1833,7 @@
           <a:p>
             <a:fld id="{2586E04A-ECEF-4D3E-B184-B1444B3FAD15}" type="datetimeFigureOut">
               <a:rPr lang="ko-KR" altLang="en-US" smtClean="0"/>
-              <a:t>2020-10-08(Thu)</a:t>
+              <a:t>2020-11-22(Sun)</a:t>
             </a:fld>
             <a:endParaRPr lang="ko-KR" altLang="en-US"/>
           </a:p>
@@ -1973,7 +1974,7 @@
           <a:p>
             <a:fld id="{2586E04A-ECEF-4D3E-B184-B1444B3FAD15}" type="datetimeFigureOut">
               <a:rPr lang="ko-KR" altLang="en-US" smtClean="0"/>
-              <a:t>2020-10-08(Thu)</a:t>
+              <a:t>2020-11-22(Sun)</a:t>
             </a:fld>
             <a:endParaRPr lang="ko-KR" altLang="en-US"/>
           </a:p>
@@ -2086,7 +2087,7 @@
           <a:p>
             <a:fld id="{2586E04A-ECEF-4D3E-B184-B1444B3FAD15}" type="datetimeFigureOut">
               <a:rPr lang="ko-KR" altLang="en-US" smtClean="0"/>
-              <a:t>2020-10-08(Thu)</a:t>
+              <a:t>2020-11-22(Sun)</a:t>
             </a:fld>
             <a:endParaRPr lang="ko-KR" altLang="en-US"/>
           </a:p>
@@ -2397,7 +2398,7 @@
           <a:p>
             <a:fld id="{2586E04A-ECEF-4D3E-B184-B1444B3FAD15}" type="datetimeFigureOut">
               <a:rPr lang="ko-KR" altLang="en-US" smtClean="0"/>
-              <a:t>2020-10-08(Thu)</a:t>
+              <a:t>2020-11-22(Sun)</a:t>
             </a:fld>
             <a:endParaRPr lang="ko-KR" altLang="en-US"/>
           </a:p>
@@ -2685,7 +2686,7 @@
           <a:p>
             <a:fld id="{2586E04A-ECEF-4D3E-B184-B1444B3FAD15}" type="datetimeFigureOut">
               <a:rPr lang="ko-KR" altLang="en-US" smtClean="0"/>
-              <a:t>2020-10-08(Thu)</a:t>
+              <a:t>2020-11-22(Sun)</a:t>
             </a:fld>
             <a:endParaRPr lang="ko-KR" altLang="en-US"/>
           </a:p>
@@ -2926,7 +2927,7 @@
           <a:p>
             <a:fld id="{2586E04A-ECEF-4D3E-B184-B1444B3FAD15}" type="datetimeFigureOut">
               <a:rPr lang="ko-KR" altLang="en-US" smtClean="0"/>
-              <a:t>2020-10-08(Thu)</a:t>
+              <a:t>2020-11-22(Sun)</a:t>
             </a:fld>
             <a:endParaRPr lang="ko-KR" altLang="en-US"/>
           </a:p>
@@ -18608,6 +18609,527 @@
 </p:sld>
 </file>
 
+<file path=ppt/slides/slide8.xml><?xml version="1.0" encoding="utf-8"?>
+<p:sld xmlns:a="http://schemas.openxmlformats.org/drawingml/2006/main" xmlns:r="http://schemas.openxmlformats.org/officeDocument/2006/relationships" xmlns:p="http://schemas.openxmlformats.org/presentationml/2006/main">
+  <p:cSld>
+    <p:spTree>
+      <p:nvGrpSpPr>
+        <p:cNvPr id="1" name=""/>
+        <p:cNvGrpSpPr/>
+        <p:nvPr/>
+      </p:nvGrpSpPr>
+      <p:grpSpPr>
+        <a:xfrm>
+          <a:off x="0" y="0"/>
+          <a:ext cx="0" cy="0"/>
+          <a:chOff x="0" y="0"/>
+          <a:chExt cx="0" cy="0"/>
+        </a:xfrm>
+      </p:grpSpPr>
+      <p:grpSp>
+        <p:nvGrpSpPr>
+          <p:cNvPr id="37" name="그룹 36">
+            <a:extLst>
+              <a:ext uri="{FF2B5EF4-FFF2-40B4-BE49-F238E27FC236}">
+                <a16:creationId xmlns:a16="http://schemas.microsoft.com/office/drawing/2014/main" id="{CE6C6FC2-ECC4-4384-B230-8E56459D765B}"/>
+              </a:ext>
+            </a:extLst>
+          </p:cNvPr>
+          <p:cNvGrpSpPr/>
+          <p:nvPr/>
+        </p:nvGrpSpPr>
+        <p:grpSpPr>
+          <a:xfrm>
+            <a:off x="1" y="1820942"/>
+            <a:ext cx="8559732" cy="2518166"/>
+            <a:chOff x="1" y="1820942"/>
+            <a:chExt cx="8559732" cy="2518166"/>
+          </a:xfrm>
+        </p:grpSpPr>
+        <p:sp>
+          <p:nvSpPr>
+            <p:cNvPr id="36" name="자유형: 도형 35">
+              <a:extLst>
+                <a:ext uri="{FF2B5EF4-FFF2-40B4-BE49-F238E27FC236}">
+                  <a16:creationId xmlns:a16="http://schemas.microsoft.com/office/drawing/2014/main" id="{52D8D745-3FFC-4AE8-97FF-03DA7BD34989}"/>
+                </a:ext>
+              </a:extLst>
+            </p:cNvPr>
+            <p:cNvSpPr/>
+            <p:nvPr/>
+          </p:nvSpPr>
+          <p:spPr>
+            <a:xfrm rot="18862910">
+              <a:off x="6458532" y="2237907"/>
+              <a:ext cx="2490999" cy="1711403"/>
+            </a:xfrm>
+            <a:custGeom>
+              <a:avLst/>
+              <a:gdLst>
+                <a:gd name="connsiteX0" fmla="*/ 1193537 w 2490999"/>
+                <a:gd name="connsiteY0" fmla="*/ 0 h 1711403"/>
+                <a:gd name="connsiteX1" fmla="*/ 1541931 w 2490999"/>
+                <a:gd name="connsiteY1" fmla="*/ 355994 h 1711403"/>
+                <a:gd name="connsiteX2" fmla="*/ 2490999 w 2490999"/>
+                <a:gd name="connsiteY2" fmla="*/ 1711403 h 1711403"/>
+                <a:gd name="connsiteX3" fmla="*/ 855701 w 2490999"/>
+                <a:gd name="connsiteY3" fmla="*/ 1711403 h 1711403"/>
+                <a:gd name="connsiteX4" fmla="*/ 0 w 2490999"/>
+                <a:gd name="connsiteY4" fmla="*/ 855702 h 1711403"/>
+                <a:gd name="connsiteX5" fmla="*/ 855702 w 2490999"/>
+                <a:gd name="connsiteY5" fmla="*/ 0 h 1711403"/>
+              </a:gdLst>
+              <a:ahLst/>
+              <a:cxnLst>
+                <a:cxn ang="0">
+                  <a:pos x="connsiteX0" y="connsiteY0"/>
+                </a:cxn>
+                <a:cxn ang="0">
+                  <a:pos x="connsiteX1" y="connsiteY1"/>
+                </a:cxn>
+                <a:cxn ang="0">
+                  <a:pos x="connsiteX2" y="connsiteY2"/>
+                </a:cxn>
+                <a:cxn ang="0">
+                  <a:pos x="connsiteX3" y="connsiteY3"/>
+                </a:cxn>
+                <a:cxn ang="0">
+                  <a:pos x="connsiteX4" y="connsiteY4"/>
+                </a:cxn>
+                <a:cxn ang="0">
+                  <a:pos x="connsiteX5" y="connsiteY5"/>
+                </a:cxn>
+              </a:cxnLst>
+              <a:rect l="l" t="t" r="r" b="b"/>
+              <a:pathLst>
+                <a:path w="2490999" h="1711403">
+                  <a:moveTo>
+                    <a:pt x="1193537" y="0"/>
+                  </a:moveTo>
+                  <a:lnTo>
+                    <a:pt x="1541931" y="355994"/>
+                  </a:lnTo>
+                  <a:lnTo>
+                    <a:pt x="2490999" y="1711403"/>
+                  </a:lnTo>
+                  <a:lnTo>
+                    <a:pt x="855701" y="1711403"/>
+                  </a:lnTo>
+                  <a:cubicBezTo>
+                    <a:pt x="383111" y="1711403"/>
+                    <a:pt x="0" y="1328292"/>
+                    <a:pt x="0" y="855702"/>
+                  </a:cubicBezTo>
+                  <a:cubicBezTo>
+                    <a:pt x="0" y="383111"/>
+                    <a:pt x="383111" y="0"/>
+                    <a:pt x="855702" y="0"/>
+                  </a:cubicBezTo>
+                  <a:close/>
+                </a:path>
+              </a:pathLst>
+            </a:custGeom>
+            <a:solidFill>
+              <a:schemeClr val="bg1">
+                <a:lumMod val="95000"/>
+              </a:schemeClr>
+            </a:solidFill>
+            <a:ln>
+              <a:noFill/>
+            </a:ln>
+          </p:spPr>
+          <p:style>
+            <a:lnRef idx="2">
+              <a:schemeClr val="accent1">
+                <a:shade val="50000"/>
+              </a:schemeClr>
+            </a:lnRef>
+            <a:fillRef idx="1">
+              <a:schemeClr val="accent1"/>
+            </a:fillRef>
+            <a:effectRef idx="0">
+              <a:schemeClr val="accent1"/>
+            </a:effectRef>
+            <a:fontRef idx="minor">
+              <a:schemeClr val="lt1"/>
+            </a:fontRef>
+          </p:style>
+          <p:txBody>
+            <a:bodyPr wrap="square" rtlCol="0" anchor="ctr">
+              <a:noAutofit/>
+            </a:bodyPr>
+            <a:lstStyle/>
+            <a:p>
+              <a:pPr algn="ctr"/>
+              <a:endParaRPr lang="ko-KR" altLang="en-US">
+                <a:solidFill>
+                  <a:prstClr val="white"/>
+                </a:solidFill>
+              </a:endParaRPr>
+            </a:p>
+          </p:txBody>
+        </p:sp>
+        <p:grpSp>
+          <p:nvGrpSpPr>
+            <p:cNvPr id="28" name="그룹 27">
+              <a:extLst>
+                <a:ext uri="{FF2B5EF4-FFF2-40B4-BE49-F238E27FC236}">
+                  <a16:creationId xmlns:a16="http://schemas.microsoft.com/office/drawing/2014/main" id="{F5357EA6-5412-4DA8-B2CB-44F757430D45}"/>
+                </a:ext>
+              </a:extLst>
+            </p:cNvPr>
+            <p:cNvGrpSpPr/>
+            <p:nvPr/>
+          </p:nvGrpSpPr>
+          <p:grpSpPr>
+            <a:xfrm>
+              <a:off x="1" y="1820942"/>
+              <a:ext cx="8365170" cy="2490999"/>
+              <a:chOff x="-2137613" y="-427307"/>
+              <a:chExt cx="4991906" cy="1486501"/>
+            </a:xfrm>
+          </p:grpSpPr>
+          <p:sp>
+            <p:nvSpPr>
+              <p:cNvPr id="15" name="자유형: 도형 14">
+                <a:extLst>
+                  <a:ext uri="{FF2B5EF4-FFF2-40B4-BE49-F238E27FC236}">
+                    <a16:creationId xmlns:a16="http://schemas.microsoft.com/office/drawing/2014/main" id="{7C7036B2-9741-4CE3-8B34-B1D00D58C6C0}"/>
+                  </a:ext>
+                </a:extLst>
+              </p:cNvPr>
+              <p:cNvSpPr/>
+              <p:nvPr/>
+            </p:nvSpPr>
+            <p:spPr>
+              <a:xfrm rot="18300000">
+                <a:off x="1600403" y="-194695"/>
+                <a:ext cx="1486501" cy="1021278"/>
+              </a:xfrm>
+              <a:custGeom>
+                <a:avLst/>
+                <a:gdLst>
+                  <a:gd name="connsiteX0" fmla="*/ 771394 w 1486501"/>
+                  <a:gd name="connsiteY0" fmla="*/ 0 h 1021278"/>
+                  <a:gd name="connsiteX1" fmla="*/ 1486501 w 1486501"/>
+                  <a:gd name="connsiteY1" fmla="*/ 1021278 h 1021278"/>
+                  <a:gd name="connsiteX2" fmla="*/ 510639 w 1486501"/>
+                  <a:gd name="connsiteY2" fmla="*/ 1021278 h 1021278"/>
+                  <a:gd name="connsiteX3" fmla="*/ 0 w 1486501"/>
+                  <a:gd name="connsiteY3" fmla="*/ 510639 h 1021278"/>
+                  <a:gd name="connsiteX4" fmla="*/ 510639 w 1486501"/>
+                  <a:gd name="connsiteY4" fmla="*/ 0 h 1021278"/>
+                </a:gdLst>
+                <a:ahLst/>
+                <a:cxnLst>
+                  <a:cxn ang="0">
+                    <a:pos x="connsiteX0" y="connsiteY0"/>
+                  </a:cxn>
+                  <a:cxn ang="0">
+                    <a:pos x="connsiteX1" y="connsiteY1"/>
+                  </a:cxn>
+                  <a:cxn ang="0">
+                    <a:pos x="connsiteX2" y="connsiteY2"/>
+                  </a:cxn>
+                  <a:cxn ang="0">
+                    <a:pos x="connsiteX3" y="connsiteY3"/>
+                  </a:cxn>
+                  <a:cxn ang="0">
+                    <a:pos x="connsiteX4" y="connsiteY4"/>
+                  </a:cxn>
+                </a:cxnLst>
+                <a:rect l="l" t="t" r="r" b="b"/>
+                <a:pathLst>
+                  <a:path w="1486501" h="1021278">
+                    <a:moveTo>
+                      <a:pt x="771394" y="0"/>
+                    </a:moveTo>
+                    <a:lnTo>
+                      <a:pt x="1486501" y="1021278"/>
+                    </a:lnTo>
+                    <a:lnTo>
+                      <a:pt x="510639" y="1021278"/>
+                    </a:lnTo>
+                    <a:cubicBezTo>
+                      <a:pt x="228621" y="1021278"/>
+                      <a:pt x="0" y="792657"/>
+                      <a:pt x="0" y="510639"/>
+                    </a:cubicBezTo>
+                    <a:cubicBezTo>
+                      <a:pt x="0" y="228621"/>
+                      <a:pt x="228621" y="0"/>
+                      <a:pt x="510639" y="0"/>
+                    </a:cubicBezTo>
+                    <a:close/>
+                  </a:path>
+                </a:pathLst>
+              </a:custGeom>
+              <a:solidFill>
+                <a:srgbClr val="FFC000"/>
+              </a:solidFill>
+              <a:ln>
+                <a:noFill/>
+              </a:ln>
+            </p:spPr>
+            <p:style>
+              <a:lnRef idx="2">
+                <a:schemeClr val="accent1">
+                  <a:shade val="50000"/>
+                </a:schemeClr>
+              </a:lnRef>
+              <a:fillRef idx="1">
+                <a:schemeClr val="accent1"/>
+              </a:fillRef>
+              <a:effectRef idx="0">
+                <a:schemeClr val="accent1"/>
+              </a:effectRef>
+              <a:fontRef idx="minor">
+                <a:schemeClr val="lt1"/>
+              </a:fontRef>
+            </p:style>
+            <p:txBody>
+              <a:bodyPr wrap="square" rtlCol="0" anchor="ctr">
+                <a:noAutofit/>
+              </a:bodyPr>
+              <a:lstStyle/>
+              <a:p>
+                <a:pPr algn="ctr"/>
+                <a:endParaRPr lang="ko-KR" altLang="en-US">
+                  <a:solidFill>
+                    <a:prstClr val="white"/>
+                  </a:solidFill>
+                </a:endParaRPr>
+              </a:p>
+            </p:txBody>
+          </p:sp>
+          <p:sp>
+            <p:nvSpPr>
+              <p:cNvPr id="13" name="자유형: 도형 12">
+                <a:extLst>
+                  <a:ext uri="{FF2B5EF4-FFF2-40B4-BE49-F238E27FC236}">
+                    <a16:creationId xmlns:a16="http://schemas.microsoft.com/office/drawing/2014/main" id="{83BC1BC1-768A-4FF3-B0F7-2504AB2463E1}"/>
+                  </a:ext>
+                </a:extLst>
+              </p:cNvPr>
+              <p:cNvSpPr/>
+              <p:nvPr/>
+            </p:nvSpPr>
+            <p:spPr>
+              <a:xfrm rot="18000000">
+                <a:off x="1541194" y="-198169"/>
+                <a:ext cx="1311253" cy="1021278"/>
+              </a:xfrm>
+              <a:custGeom>
+                <a:avLst/>
+                <a:gdLst>
+                  <a:gd name="connsiteX0" fmla="*/ 721618 w 1311253"/>
+                  <a:gd name="connsiteY0" fmla="*/ 0 h 1021278"/>
+                  <a:gd name="connsiteX1" fmla="*/ 1311253 w 1311253"/>
+                  <a:gd name="connsiteY1" fmla="*/ 1021278 h 1021278"/>
+                  <a:gd name="connsiteX2" fmla="*/ 319037 w 1311253"/>
+                  <a:gd name="connsiteY2" fmla="*/ 1021278 h 1021278"/>
+                  <a:gd name="connsiteX3" fmla="*/ 0 w 1311253"/>
+                  <a:gd name="connsiteY3" fmla="*/ 702241 h 1021278"/>
+                  <a:gd name="connsiteX4" fmla="*/ 0 w 1311253"/>
+                  <a:gd name="connsiteY4" fmla="*/ 319037 h 1021278"/>
+                  <a:gd name="connsiteX5" fmla="*/ 319037 w 1311253"/>
+                  <a:gd name="connsiteY5" fmla="*/ 0 h 1021278"/>
+                </a:gdLst>
+                <a:ahLst/>
+                <a:cxnLst>
+                  <a:cxn ang="0">
+                    <a:pos x="connsiteX0" y="connsiteY0"/>
+                  </a:cxn>
+                  <a:cxn ang="0">
+                    <a:pos x="connsiteX1" y="connsiteY1"/>
+                  </a:cxn>
+                  <a:cxn ang="0">
+                    <a:pos x="connsiteX2" y="connsiteY2"/>
+                  </a:cxn>
+                  <a:cxn ang="0">
+                    <a:pos x="connsiteX3" y="connsiteY3"/>
+                  </a:cxn>
+                  <a:cxn ang="0">
+                    <a:pos x="connsiteX4" y="connsiteY4"/>
+                  </a:cxn>
+                  <a:cxn ang="0">
+                    <a:pos x="connsiteX5" y="connsiteY5"/>
+                  </a:cxn>
+                </a:cxnLst>
+                <a:rect l="l" t="t" r="r" b="b"/>
+                <a:pathLst>
+                  <a:path w="1311253" h="1021278">
+                    <a:moveTo>
+                      <a:pt x="721618" y="0"/>
+                    </a:moveTo>
+                    <a:lnTo>
+                      <a:pt x="1311253" y="1021278"/>
+                    </a:lnTo>
+                    <a:lnTo>
+                      <a:pt x="319037" y="1021278"/>
+                    </a:lnTo>
+                    <a:cubicBezTo>
+                      <a:pt x="142838" y="1021278"/>
+                      <a:pt x="0" y="878440"/>
+                      <a:pt x="0" y="702241"/>
+                    </a:cubicBezTo>
+                    <a:lnTo>
+                      <a:pt x="0" y="319037"/>
+                    </a:lnTo>
+                    <a:cubicBezTo>
+                      <a:pt x="0" y="142838"/>
+                      <a:pt x="142838" y="0"/>
+                      <a:pt x="319037" y="0"/>
+                    </a:cubicBezTo>
+                    <a:close/>
+                  </a:path>
+                </a:pathLst>
+              </a:custGeom>
+              <a:solidFill>
+                <a:schemeClr val="bg2">
+                  <a:lumMod val="25000"/>
+                </a:schemeClr>
+              </a:solidFill>
+              <a:ln>
+                <a:noFill/>
+              </a:ln>
+            </p:spPr>
+            <p:style>
+              <a:lnRef idx="2">
+                <a:schemeClr val="accent1">
+                  <a:shade val="50000"/>
+                </a:schemeClr>
+              </a:lnRef>
+              <a:fillRef idx="1">
+                <a:schemeClr val="accent1"/>
+              </a:fillRef>
+              <a:effectRef idx="0">
+                <a:schemeClr val="accent1"/>
+              </a:effectRef>
+              <a:fontRef idx="minor">
+                <a:schemeClr val="lt1"/>
+              </a:fontRef>
+            </p:style>
+            <p:txBody>
+              <a:bodyPr wrap="square" rtlCol="0" anchor="ctr">
+                <a:noAutofit/>
+              </a:bodyPr>
+              <a:lstStyle/>
+              <a:p>
+                <a:pPr algn="ctr"/>
+                <a:endParaRPr lang="ko-KR" altLang="en-US">
+                  <a:solidFill>
+                    <a:prstClr val="white"/>
+                  </a:solidFill>
+                </a:endParaRPr>
+              </a:p>
+            </p:txBody>
+          </p:sp>
+          <p:sp>
+            <p:nvSpPr>
+              <p:cNvPr id="5" name="직사각형 4">
+                <a:extLst>
+                  <a:ext uri="{FF2B5EF4-FFF2-40B4-BE49-F238E27FC236}">
+                    <a16:creationId xmlns:a16="http://schemas.microsoft.com/office/drawing/2014/main" id="{03486F2F-3BC2-44B6-9674-2789396E3EBA}"/>
+                  </a:ext>
+                </a:extLst>
+              </p:cNvPr>
+              <p:cNvSpPr/>
+              <p:nvPr/>
+            </p:nvSpPr>
+            <p:spPr>
+              <a:xfrm>
+                <a:off x="-2137613" y="0"/>
+                <a:ext cx="4358300" cy="1021278"/>
+              </a:xfrm>
+              <a:prstGeom prst="rect">
+                <a:avLst/>
+              </a:prstGeom>
+              <a:solidFill>
+                <a:schemeClr val="bg2">
+                  <a:lumMod val="25000"/>
+                </a:schemeClr>
+              </a:solidFill>
+              <a:ln>
+                <a:noFill/>
+              </a:ln>
+            </p:spPr>
+            <p:style>
+              <a:lnRef idx="2">
+                <a:schemeClr val="accent1">
+                  <a:shade val="50000"/>
+                </a:schemeClr>
+              </a:lnRef>
+              <a:fillRef idx="1">
+                <a:schemeClr val="accent1"/>
+              </a:fillRef>
+              <a:effectRef idx="0">
+                <a:schemeClr val="accent1"/>
+              </a:effectRef>
+              <a:fontRef idx="minor">
+                <a:schemeClr val="lt1"/>
+              </a:fontRef>
+            </p:style>
+            <p:txBody>
+              <a:bodyPr lIns="144000" rtlCol="0" anchor="ctr"/>
+              <a:lstStyle/>
+              <a:p>
+                <a:pPr algn="ctr" latinLnBrk="0">
+                  <a:defRPr/>
+                </a:pPr>
+                <a:r>
+                  <a:rPr lang="en-US" altLang="ko-KR" sz="5000" b="1" kern="0" dirty="0">
+                    <a:solidFill>
+                      <a:prstClr val="white"/>
+                    </a:solidFill>
+                    <a:effectLst>
+                      <a:glow rad="63500">
+                        <a:schemeClr val="accent4">
+                          <a:satMod val="175000"/>
+                          <a:alpha val="40000"/>
+                        </a:schemeClr>
+                      </a:glow>
+                      <a:reflection blurRad="6350" stA="55000" endA="300" endPos="45500" dir="5400000" sy="-100000" algn="bl" rotWithShape="0"/>
+                    </a:effectLst>
+                    <a:latin typeface="Koverwatch" panose="02020603020101020101" pitchFamily="18" charset="-127"/>
+                    <a:ea typeface="Koverwatch" panose="02020603020101020101" pitchFamily="18" charset="-127"/>
+                  </a:rPr>
+                  <a:t>Thank you</a:t>
+                </a:r>
+                <a:endParaRPr lang="ko-KR" altLang="en-US" sz="5000" b="1" kern="0" dirty="0">
+                  <a:solidFill>
+                    <a:prstClr val="white"/>
+                  </a:solidFill>
+                  <a:effectLst>
+                    <a:glow rad="63500">
+                      <a:schemeClr val="accent4">
+                        <a:satMod val="175000"/>
+                        <a:alpha val="40000"/>
+                      </a:schemeClr>
+                    </a:glow>
+                    <a:reflection blurRad="6350" stA="55000" endA="300" endPos="45500" dir="5400000" sy="-100000" algn="bl" rotWithShape="0"/>
+                  </a:effectLst>
+                  <a:latin typeface="Koverwatch" panose="02020603020101020101" pitchFamily="18" charset="-127"/>
+                  <a:ea typeface="Koverwatch" panose="02020603020101020101" pitchFamily="18" charset="-127"/>
+                </a:endParaRPr>
+              </a:p>
+            </p:txBody>
+          </p:sp>
+        </p:grpSp>
+      </p:grpSp>
+    </p:spTree>
+    <p:extLst>
+      <p:ext uri="{BB962C8B-B14F-4D97-AF65-F5344CB8AC3E}">
+        <p14:creationId xmlns:p14="http://schemas.microsoft.com/office/powerpoint/2010/main" val="1956030404"/>
+      </p:ext>
+    </p:extLst>
+  </p:cSld>
+  <p:clrMapOvr>
+    <a:masterClrMapping/>
+  </p:clrMapOvr>
+</p:sld>
+</file>
+
 <file path=ppt/theme/theme1.xml><?xml version="1.0" encoding="utf-8"?>
 <a:theme xmlns:a="http://schemas.openxmlformats.org/drawingml/2006/main" name="Office 테마">
   <a:themeElements>

</xml_diff>